<commit_message>
Add hyperlink to QR code in PPT and PDF of "setting up a data science organisation" poster
Note: To preserve clickable hyperlink in PDF, I had to open the PPT in Keynote on a Mac and export to PDF from there
</commit_message>
<xml_diff>
--- a/publications/Poster Setting up a data science organisation editable.pptx
+++ b/publications/Poster Setting up a data science organisation editable.pptx
@@ -520,7 +520,7 @@
           <a:p>
             <a:fld id="{99E1C979-2E42-4F75-9BA8-B12D56559F8E}" type="datetimeFigureOut">
               <a:rPr lang="en-GB" smtClean="0"/>
-              <a:t>09/04/2018</a:t>
+              <a:t>16/04/2018</a:t>
             </a:fld>
             <a:endParaRPr lang="en-GB"/>
           </a:p>
@@ -690,7 +690,7 @@
           <a:p>
             <a:fld id="{99E1C979-2E42-4F75-9BA8-B12D56559F8E}" type="datetimeFigureOut">
               <a:rPr lang="en-GB" smtClean="0"/>
-              <a:t>09/04/2018</a:t>
+              <a:t>16/04/2018</a:t>
             </a:fld>
             <a:endParaRPr lang="en-GB"/>
           </a:p>
@@ -870,7 +870,7 @@
           <a:p>
             <a:fld id="{99E1C979-2E42-4F75-9BA8-B12D56559F8E}" type="datetimeFigureOut">
               <a:rPr lang="en-GB" smtClean="0"/>
-              <a:t>09/04/2018</a:t>
+              <a:t>16/04/2018</a:t>
             </a:fld>
             <a:endParaRPr lang="en-GB"/>
           </a:p>
@@ -1040,7 +1040,7 @@
           <a:p>
             <a:fld id="{99E1C979-2E42-4F75-9BA8-B12D56559F8E}" type="datetimeFigureOut">
               <a:rPr lang="en-GB" smtClean="0"/>
-              <a:t>09/04/2018</a:t>
+              <a:t>16/04/2018</a:t>
             </a:fld>
             <a:endParaRPr lang="en-GB"/>
           </a:p>
@@ -1284,7 +1284,7 @@
           <a:p>
             <a:fld id="{99E1C979-2E42-4F75-9BA8-B12D56559F8E}" type="datetimeFigureOut">
               <a:rPr lang="en-GB" smtClean="0"/>
-              <a:t>09/04/2018</a:t>
+              <a:t>16/04/2018</a:t>
             </a:fld>
             <a:endParaRPr lang="en-GB"/>
           </a:p>
@@ -1516,7 +1516,7 @@
           <a:p>
             <a:fld id="{99E1C979-2E42-4F75-9BA8-B12D56559F8E}" type="datetimeFigureOut">
               <a:rPr lang="en-GB" smtClean="0"/>
-              <a:t>09/04/2018</a:t>
+              <a:t>16/04/2018</a:t>
             </a:fld>
             <a:endParaRPr lang="en-GB"/>
           </a:p>
@@ -1883,7 +1883,7 @@
           <a:p>
             <a:fld id="{99E1C979-2E42-4F75-9BA8-B12D56559F8E}" type="datetimeFigureOut">
               <a:rPr lang="en-GB" smtClean="0"/>
-              <a:t>09/04/2018</a:t>
+              <a:t>16/04/2018</a:t>
             </a:fld>
             <a:endParaRPr lang="en-GB"/>
           </a:p>
@@ -2001,7 +2001,7 @@
           <a:p>
             <a:fld id="{99E1C979-2E42-4F75-9BA8-B12D56559F8E}" type="datetimeFigureOut">
               <a:rPr lang="en-GB" smtClean="0"/>
-              <a:t>09/04/2018</a:t>
+              <a:t>16/04/2018</a:t>
             </a:fld>
             <a:endParaRPr lang="en-GB"/>
           </a:p>
@@ -2096,7 +2096,7 @@
           <a:p>
             <a:fld id="{99E1C979-2E42-4F75-9BA8-B12D56559F8E}" type="datetimeFigureOut">
               <a:rPr lang="en-GB" smtClean="0"/>
-              <a:t>09/04/2018</a:t>
+              <a:t>16/04/2018</a:t>
             </a:fld>
             <a:endParaRPr lang="en-GB"/>
           </a:p>
@@ -2373,7 +2373,7 @@
           <a:p>
             <a:fld id="{99E1C979-2E42-4F75-9BA8-B12D56559F8E}" type="datetimeFigureOut">
               <a:rPr lang="en-GB" smtClean="0"/>
-              <a:t>09/04/2018</a:t>
+              <a:t>16/04/2018</a:t>
             </a:fld>
             <a:endParaRPr lang="en-GB"/>
           </a:p>
@@ -2630,7 +2630,7 @@
           <a:p>
             <a:fld id="{99E1C979-2E42-4F75-9BA8-B12D56559F8E}" type="datetimeFigureOut">
               <a:rPr lang="en-GB" smtClean="0"/>
-              <a:t>09/04/2018</a:t>
+              <a:t>16/04/2018</a:t>
             </a:fld>
             <a:endParaRPr lang="en-GB"/>
           </a:p>
@@ -2843,7 +2843,7 @@
           <a:p>
             <a:fld id="{99E1C979-2E42-4F75-9BA8-B12D56559F8E}" type="datetimeFigureOut">
               <a:rPr lang="en-GB" smtClean="0"/>
-              <a:t>09/04/2018</a:t>
+              <a:t>16/04/2018</a:t>
             </a:fld>
             <a:endParaRPr lang="en-GB"/>
           </a:p>
@@ -4822,6 +4822,7 @@
       <p:pic>
         <p:nvPicPr>
           <p:cNvPr id="7" name="Picture 6">
+            <a:hlinkClick r:id="rId11"/>
             <a:extLst>
               <a:ext uri="{FF2B5EF4-FFF2-40B4-BE49-F238E27FC236}">
                 <a16:creationId xmlns:a16="http://schemas.microsoft.com/office/drawing/2014/main" id="{74B97489-1F9C-4439-8C50-D6C6F870BBC3}"/>
@@ -4834,7 +4835,7 @@
           <p:nvPr/>
         </p:nvPicPr>
         <p:blipFill>
-          <a:blip r:embed="rId11">
+          <a:blip r:embed="rId12">
             <a:extLst>
               <a:ext uri="{28A0092B-C50C-407E-A947-70E740481C1C}">
                 <a14:useLocalDpi xmlns:a14="http://schemas.microsoft.com/office/drawing/2010/main" val="0"/>

</xml_diff>